<commit_message>
powerpoint fini pour vrai
</commit_message>
<xml_diff>
--- a/PP.pptx
+++ b/PP.pptx
@@ -869,7 +869,7 @@
           <a:p>
             <a:fld id="{27F54CF7-68EA-2049-AF1D-68CFF274CF67}" type="datetimeFigureOut">
               <a:rPr lang="fr-FR" smtClean="0"/>
-              <a:t>21/04/2020</a:t>
+              <a:t>22/04/2020</a:t>
             </a:fld>
             <a:endParaRPr lang="fr-FR"/>
           </a:p>
@@ -1120,7 +1120,7 @@
           <a:p>
             <a:fld id="{27F54CF7-68EA-2049-AF1D-68CFF274CF67}" type="datetimeFigureOut">
               <a:rPr lang="fr-FR" smtClean="0"/>
-              <a:t>21/04/2020</a:t>
+              <a:t>22/04/2020</a:t>
             </a:fld>
             <a:endParaRPr lang="fr-FR"/>
           </a:p>
@@ -1434,7 +1434,7 @@
           <a:p>
             <a:fld id="{27F54CF7-68EA-2049-AF1D-68CFF274CF67}" type="datetimeFigureOut">
               <a:rPr lang="fr-FR" smtClean="0"/>
-              <a:t>21/04/2020</a:t>
+              <a:t>22/04/2020</a:t>
             </a:fld>
             <a:endParaRPr lang="fr-FR"/>
           </a:p>
@@ -1775,7 +1775,7 @@
           <a:p>
             <a:fld id="{27F54CF7-68EA-2049-AF1D-68CFF274CF67}" type="datetimeFigureOut">
               <a:rPr lang="fr-FR" smtClean="0"/>
-              <a:t>21/04/2020</a:t>
+              <a:t>22/04/2020</a:t>
             </a:fld>
             <a:endParaRPr lang="fr-FR"/>
           </a:p>
@@ -2089,7 +2089,7 @@
           <a:p>
             <a:fld id="{27F54CF7-68EA-2049-AF1D-68CFF274CF67}" type="datetimeFigureOut">
               <a:rPr lang="fr-FR" smtClean="0"/>
-              <a:t>21/04/2020</a:t>
+              <a:t>22/04/2020</a:t>
             </a:fld>
             <a:endParaRPr lang="fr-FR"/>
           </a:p>
@@ -2482,7 +2482,7 @@
           <a:p>
             <a:fld id="{27F54CF7-68EA-2049-AF1D-68CFF274CF67}" type="datetimeFigureOut">
               <a:rPr lang="fr-FR" smtClean="0"/>
-              <a:t>21/04/2020</a:t>
+              <a:t>22/04/2020</a:t>
             </a:fld>
             <a:endParaRPr lang="fr-FR"/>
           </a:p>
@@ -2652,7 +2652,7 @@
           <a:p>
             <a:fld id="{27F54CF7-68EA-2049-AF1D-68CFF274CF67}" type="datetimeFigureOut">
               <a:rPr lang="fr-FR" smtClean="0"/>
-              <a:t>21/04/2020</a:t>
+              <a:t>22/04/2020</a:t>
             </a:fld>
             <a:endParaRPr lang="fr-FR"/>
           </a:p>
@@ -2832,7 +2832,7 @@
           <a:p>
             <a:fld id="{27F54CF7-68EA-2049-AF1D-68CFF274CF67}" type="datetimeFigureOut">
               <a:rPr lang="fr-FR" smtClean="0"/>
-              <a:t>21/04/2020</a:t>
+              <a:t>22/04/2020</a:t>
             </a:fld>
             <a:endParaRPr lang="fr-FR"/>
           </a:p>
@@ -3008,7 +3008,7 @@
           <a:p>
             <a:fld id="{27F54CF7-68EA-2049-AF1D-68CFF274CF67}" type="datetimeFigureOut">
               <a:rPr lang="fr-FR" smtClean="0"/>
-              <a:t>21/04/2020</a:t>
+              <a:t>22/04/2020</a:t>
             </a:fld>
             <a:endParaRPr lang="fr-FR"/>
           </a:p>
@@ -3255,7 +3255,7 @@
           <a:p>
             <a:fld id="{27F54CF7-68EA-2049-AF1D-68CFF274CF67}" type="datetimeFigureOut">
               <a:rPr lang="fr-FR" smtClean="0"/>
-              <a:t>21/04/2020</a:t>
+              <a:t>22/04/2020</a:t>
             </a:fld>
             <a:endParaRPr lang="fr-FR"/>
           </a:p>
@@ -3487,7 +3487,7 @@
           <a:p>
             <a:fld id="{27F54CF7-68EA-2049-AF1D-68CFF274CF67}" type="datetimeFigureOut">
               <a:rPr lang="fr-FR" smtClean="0"/>
-              <a:t>21/04/2020</a:t>
+              <a:t>22/04/2020</a:t>
             </a:fld>
             <a:endParaRPr lang="fr-FR"/>
           </a:p>
@@ -3861,7 +3861,7 @@
           <a:p>
             <a:fld id="{27F54CF7-68EA-2049-AF1D-68CFF274CF67}" type="datetimeFigureOut">
               <a:rPr lang="fr-FR" smtClean="0"/>
-              <a:t>21/04/2020</a:t>
+              <a:t>22/04/2020</a:t>
             </a:fld>
             <a:endParaRPr lang="fr-FR"/>
           </a:p>
@@ -3984,7 +3984,7 @@
           <a:p>
             <a:fld id="{27F54CF7-68EA-2049-AF1D-68CFF274CF67}" type="datetimeFigureOut">
               <a:rPr lang="fr-FR" smtClean="0"/>
-              <a:t>21/04/2020</a:t>
+              <a:t>22/04/2020</a:t>
             </a:fld>
             <a:endParaRPr lang="fr-FR"/>
           </a:p>
@@ -4079,7 +4079,7 @@
           <a:p>
             <a:fld id="{27F54CF7-68EA-2049-AF1D-68CFF274CF67}" type="datetimeFigureOut">
               <a:rPr lang="fr-FR" smtClean="0"/>
-              <a:t>21/04/2020</a:t>
+              <a:t>22/04/2020</a:t>
             </a:fld>
             <a:endParaRPr lang="fr-FR"/>
           </a:p>
@@ -4334,7 +4334,7 @@
           <a:p>
             <a:fld id="{27F54CF7-68EA-2049-AF1D-68CFF274CF67}" type="datetimeFigureOut">
               <a:rPr lang="fr-FR" smtClean="0"/>
-              <a:t>21/04/2020</a:t>
+              <a:t>22/04/2020</a:t>
             </a:fld>
             <a:endParaRPr lang="fr-FR"/>
           </a:p>
@@ -4597,7 +4597,7 @@
           <a:p>
             <a:fld id="{27F54CF7-68EA-2049-AF1D-68CFF274CF67}" type="datetimeFigureOut">
               <a:rPr lang="fr-FR" smtClean="0"/>
-              <a:t>21/04/2020</a:t>
+              <a:t>22/04/2020</a:t>
             </a:fld>
             <a:endParaRPr lang="fr-FR"/>
           </a:p>
@@ -5340,7 +5340,7 @@
           <a:p>
             <a:fld id="{27F54CF7-68EA-2049-AF1D-68CFF274CF67}" type="datetimeFigureOut">
               <a:rPr lang="fr-FR" smtClean="0"/>
-              <a:t>21/04/2020</a:t>
+              <a:t>22/04/2020</a:t>
             </a:fld>
             <a:endParaRPr lang="fr-FR"/>
           </a:p>
@@ -10219,10 +10219,10 @@
       </p:sp>
       <p:pic>
         <p:nvPicPr>
-          <p:cNvPr id="9" name="Image 8">
+          <p:cNvPr id="5" name="Image 4" descr="Une image contenant texte, carte&#10;&#10;Description générée automatiquement">
             <a:extLst>
               <a:ext uri="{FF2B5EF4-FFF2-40B4-BE49-F238E27FC236}">
-                <a16:creationId xmlns:a16="http://schemas.microsoft.com/office/drawing/2014/main" id="{84B47287-8DBF-4839-A89F-6D1F22352CF8}"/>
+                <a16:creationId xmlns:a16="http://schemas.microsoft.com/office/drawing/2014/main" id="{9E563C16-DE3A-49D9-B3C2-8C4F0340E738}"/>
               </a:ext>
             </a:extLst>
           </p:cNvPr>
@@ -10239,8 +10239,8 @@
         </p:blipFill>
         <p:spPr>
           <a:xfrm>
-            <a:off x="4434583" y="1966309"/>
-            <a:ext cx="7505489" cy="4730205"/>
+            <a:off x="4253271" y="1930400"/>
+            <a:ext cx="7449590" cy="4696480"/>
           </a:xfrm>
           <a:prstGeom prst="rect">
             <a:avLst/>

</xml_diff>